<commit_message>
[improvement] Fleshed out parts and properties necessary for building a basic Powerpoint file (26h)
</commit_message>
<xml_diff>
--- a/spec/fixtures/bg_slide.pptx
+++ b/spec/fixtures/bg_slide.pptx
@@ -2,7 +2,7 @@
 <file path=ppt/presentation.xml><?xml version="1.0" encoding="utf-8"?>
 <p:presentation xmlns:a="http://schemas.openxmlformats.org/drawingml/2006/main" xmlns:r="http://schemas.openxmlformats.org/officeDocument/2006/relationships" xmlns:p="http://schemas.openxmlformats.org/presentationml/2006/main">
   <p:sldMasterIdLst>
-    <p:sldMasterId r:id="rId1"/>
+    <p:sldMasterId id="356" r:id="rId1"/>
   </p:sldMasterIdLst>
   <p:sldIdLst>
     <p:sldId id="256" r:id="rId2"/>
@@ -12,8 +12,8 @@
 </p:presentation>
 </file>
 
-<file path=ppt/slideLayouts/slideLayoutBasic.xml><?xml version="1.0" encoding="utf-8"?>
-<p:sldLayout xmlns:a="http://schemas.openxmlformats.org/drawingml/2006/main" xmlns:r="http://schemas.openxmlformats.org/officeDocument/2006/relationships" xmlns:p="http://schemas.openxmlformats.org/presentationml/2006/main" type="blank" preserve="1">
+<file path=ppt/slideLayouts/slideLayout1.xml><?xml version="1.0" encoding="utf-8"?>
+<p:sldLayout xmlns:a="http://schemas.openxmlformats.org/drawingml/2006/main" xmlns:r="http://schemas.openxmlformats.org/officeDocument/2006/relationships" xmlns:p="http://schemas.openxmlformats.org/presentationml/2006/main">
   <p:cSld name="Basic">
     <p:spTree>
       <p:nvGrpSpPr>
@@ -27,7 +27,7 @@
 </p:sldLayout>
 </file>
 
-<file path=ppt/slideMasters/slideMasterBasic.xml><?xml version="1.0" encoding="utf-8"?>
+<file path=ppt/slideMasters/slideMaster1.xml><?xml version="1.0" encoding="utf-8"?>
 <p:sldMaster xmlns:a="http://schemas.openxmlformats.org/drawingml/2006/main" xmlns:r="http://schemas.openxmlformats.org/officeDocument/2006/relationships" xmlns:p="http://schemas.openxmlformats.org/presentationml/2006/main">
   <p:cSld>
     <p:spTree>
@@ -41,7 +41,7 @@
   </p:cSld>
   <p:clrMap bg1="lt1" tx1="dk1" bg2="lt2" tx2="dk2" accent1="accent1" accent2="accent2" accent3="accent3" accent4="accent4" accent5="accent5" accent6="accent6" hlink="hlink" folHlink="folHlink"/>
   <p:sldLayoutIdLst>
-    <p:sldLayoutId r:id="rId7"/>
+    <p:sldLayoutId id="256" r:id="rId7"/>
   </p:sldLayoutIdLst>
 </p:sldMaster>
 </file>
@@ -68,7 +68,7 @@
 </p:sld>
 </file>
 
-<file path=ppt/theme/themeBasic.xml><?xml version="1.0" encoding="utf-8"?>
+<file path=ppt/theme/theme1.xml><?xml version="1.0" encoding="utf-8"?>
 <a:theme xmlns:a="http://schemas.openxmlformats.org/drawingml/2006/main" name="Office Theme">
   <a:themeElements>
     <a:clrScheme name="Office">

</xml_diff>